<commit_message>
Minor updates to the Ethics presentation.
</commit_message>
<xml_diff>
--- a/presentations/01_ethics.pptx
+++ b/presentations/01_ethics.pptx
@@ -239,7 +239,7 @@
           <a:p>
             <a:fld id="{FD93C9B2-20F6-4DB1-B471-224337D0AC79}" type="datetimeFigureOut">
               <a:rPr lang="en-US" smtClean="0"/>
-              <a:t>8/5/2022</a:t>
+              <a:t>9/16/2022</a:t>
             </a:fld>
             <a:endParaRPr lang="en-US"/>
           </a:p>
@@ -5653,7 +5653,7 @@
           <a:p>
             <a:fld id="{C3F78080-8D0A-4BE8-A5B4-CB115102D524}" type="datetimeFigureOut">
               <a:rPr lang="en-US" smtClean="0"/>
-              <a:t>8/5/2022</a:t>
+              <a:t>9/16/2022</a:t>
             </a:fld>
             <a:endParaRPr lang="en-US"/>
           </a:p>
@@ -5851,7 +5851,7 @@
           <a:p>
             <a:fld id="{C3F78080-8D0A-4BE8-A5B4-CB115102D524}" type="datetimeFigureOut">
               <a:rPr lang="en-US" smtClean="0"/>
-              <a:t>8/5/2022</a:t>
+              <a:t>9/16/2022</a:t>
             </a:fld>
             <a:endParaRPr lang="en-US"/>
           </a:p>
@@ -6059,7 +6059,7 @@
           <a:p>
             <a:fld id="{C3F78080-8D0A-4BE8-A5B4-CB115102D524}" type="datetimeFigureOut">
               <a:rPr lang="en-US" smtClean="0"/>
-              <a:t>8/5/2022</a:t>
+              <a:t>9/16/2022</a:t>
             </a:fld>
             <a:endParaRPr lang="en-US"/>
           </a:p>
@@ -6257,7 +6257,7 @@
           <a:p>
             <a:fld id="{C3F78080-8D0A-4BE8-A5B4-CB115102D524}" type="datetimeFigureOut">
               <a:rPr lang="en-US" smtClean="0"/>
-              <a:t>8/5/2022</a:t>
+              <a:t>9/16/2022</a:t>
             </a:fld>
             <a:endParaRPr lang="en-US"/>
           </a:p>
@@ -6532,7 +6532,7 @@
           <a:p>
             <a:fld id="{C3F78080-8D0A-4BE8-A5B4-CB115102D524}" type="datetimeFigureOut">
               <a:rPr lang="en-US" smtClean="0"/>
-              <a:t>8/5/2022</a:t>
+              <a:t>9/16/2022</a:t>
             </a:fld>
             <a:endParaRPr lang="en-US"/>
           </a:p>
@@ -6797,7 +6797,7 @@
           <a:p>
             <a:fld id="{C3F78080-8D0A-4BE8-A5B4-CB115102D524}" type="datetimeFigureOut">
               <a:rPr lang="en-US" smtClean="0"/>
-              <a:t>8/5/2022</a:t>
+              <a:t>9/16/2022</a:t>
             </a:fld>
             <a:endParaRPr lang="en-US"/>
           </a:p>
@@ -7209,7 +7209,7 @@
           <a:p>
             <a:fld id="{C3F78080-8D0A-4BE8-A5B4-CB115102D524}" type="datetimeFigureOut">
               <a:rPr lang="en-US" smtClean="0"/>
-              <a:t>8/5/2022</a:t>
+              <a:t>9/16/2022</a:t>
             </a:fld>
             <a:endParaRPr lang="en-US"/>
           </a:p>
@@ -7350,7 +7350,7 @@
           <a:p>
             <a:fld id="{C3F78080-8D0A-4BE8-A5B4-CB115102D524}" type="datetimeFigureOut">
               <a:rPr lang="en-US" smtClean="0"/>
-              <a:t>8/5/2022</a:t>
+              <a:t>9/16/2022</a:t>
             </a:fld>
             <a:endParaRPr lang="en-US"/>
           </a:p>
@@ -7463,7 +7463,7 @@
           <a:p>
             <a:fld id="{C3F78080-8D0A-4BE8-A5B4-CB115102D524}" type="datetimeFigureOut">
               <a:rPr lang="en-US" smtClean="0"/>
-              <a:t>8/5/2022</a:t>
+              <a:t>9/16/2022</a:t>
             </a:fld>
             <a:endParaRPr lang="en-US"/>
           </a:p>
@@ -7774,7 +7774,7 @@
           <a:p>
             <a:fld id="{C3F78080-8D0A-4BE8-A5B4-CB115102D524}" type="datetimeFigureOut">
               <a:rPr lang="en-US" smtClean="0"/>
-              <a:t>8/5/2022</a:t>
+              <a:t>9/16/2022</a:t>
             </a:fld>
             <a:endParaRPr lang="en-US"/>
           </a:p>
@@ -8062,7 +8062,7 @@
           <a:p>
             <a:fld id="{C3F78080-8D0A-4BE8-A5B4-CB115102D524}" type="datetimeFigureOut">
               <a:rPr lang="en-US" smtClean="0"/>
-              <a:t>8/5/2022</a:t>
+              <a:t>9/16/2022</a:t>
             </a:fld>
             <a:endParaRPr lang="en-US"/>
           </a:p>
@@ -8303,7 +8303,7 @@
           <a:p>
             <a:fld id="{C3F78080-8D0A-4BE8-A5B4-CB115102D524}" type="datetimeFigureOut">
               <a:rPr lang="en-US" smtClean="0"/>
-              <a:t>8/5/2022</a:t>
+              <a:t>9/16/2022</a:t>
             </a:fld>
             <a:endParaRPr lang="en-US"/>
           </a:p>
@@ -11558,8 +11558,8 @@
         </p:nvSpPr>
         <p:spPr>
           <a:xfrm>
-            <a:off x="0" y="365127"/>
-            <a:ext cx="12191999" cy="827416"/>
+            <a:off x="618698" y="365127"/>
+            <a:ext cx="10829613" cy="827416"/>
           </a:xfrm>
         </p:spPr>
         <p:txBody>
@@ -11568,7 +11568,6 @@
           </a:bodyPr>
           <a:lstStyle/>
           <a:p>
-            <a:pPr algn="ctr"/>
             <a:r>
               <a:rPr lang="en-US" sz="3600" dirty="0">
                 <a:solidFill>
@@ -11580,7 +11579,7 @@
                 <a:latin typeface="Palatino Linotype" panose="02040502050505030304" pitchFamily="18" charset="0"/>
                 <a:cs typeface="Segoe UI Light" panose="020B0502040204020203" pitchFamily="34" charset="0"/>
               </a:rPr>
-              <a:t>Agenda</a:t>
+              <a:t>Lesson Overview</a:t>
             </a:r>
           </a:p>
         </p:txBody>
@@ -11599,7 +11598,7 @@
         </p:nvSpPr>
         <p:spPr>
           <a:xfrm>
-            <a:off x="524185" y="2216180"/>
+            <a:off x="524185" y="1643303"/>
             <a:ext cx="10924126" cy="2831544"/>
           </a:xfrm>
           <a:prstGeom prst="rect">
@@ -15789,7 +15788,7 @@
         <p:spPr>
           <a:xfrm>
             <a:off x="7253262" y="3797186"/>
-            <a:ext cx="1625600" cy="2085920"/>
+            <a:ext cx="1625600" cy="907016"/>
           </a:xfrm>
           <a:prstGeom prst="rect">
             <a:avLst/>
@@ -15854,7 +15853,7 @@
         <p:spPr>
           <a:xfrm>
             <a:off x="4960405" y="3797186"/>
-            <a:ext cx="1625600" cy="2085920"/>
+            <a:ext cx="1625600" cy="907016"/>
           </a:xfrm>
           <a:prstGeom prst="rect">
             <a:avLst/>
@@ -15919,7 +15918,7 @@
         <p:spPr>
           <a:xfrm>
             <a:off x="2712505" y="3797186"/>
-            <a:ext cx="1625600" cy="2085920"/>
+            <a:ext cx="1625600" cy="907016"/>
           </a:xfrm>
           <a:prstGeom prst="rect">
             <a:avLst/>
@@ -15971,147 +15970,6 @@
       </p:sp>
       <p:pic>
         <p:nvPicPr>
-          <p:cNvPr id="5" name="Picture 4">
-            <a:extLst>
-              <a:ext uri="{FF2B5EF4-FFF2-40B4-BE49-F238E27FC236}">
-                <a16:creationId xmlns:a16="http://schemas.microsoft.com/office/drawing/2014/main" id="{B3DFFDEF-2165-44D7-ABC7-0588FA782C93}"/>
-              </a:ext>
-            </a:extLst>
-          </p:cNvPr>
-          <p:cNvPicPr>
-            <a:picLocks noChangeAspect="1" noChangeArrowheads="1"/>
-          </p:cNvPicPr>
-          <p:nvPr/>
-        </p:nvPicPr>
-        <p:blipFill>
-          <a:blip r:embed="rId3">
-            <a:extLst>
-              <a:ext uri="{28A0092B-C50C-407E-A947-70E740481C1C}">
-                <a14:useLocalDpi xmlns:a14="http://schemas.microsoft.com/office/drawing/2010/main" val="0"/>
-              </a:ext>
-            </a:extLst>
-          </a:blip>
-          <a:srcRect/>
-          <a:stretch>
-            <a:fillRect/>
-          </a:stretch>
-        </p:blipFill>
-        <p:spPr bwMode="auto">
-          <a:xfrm>
-            <a:off x="2812545" y="4235888"/>
-            <a:ext cx="1425520" cy="1425520"/>
-          </a:xfrm>
-          <a:prstGeom prst="rect">
-            <a:avLst/>
-          </a:prstGeom>
-          <a:noFill/>
-          <a:extLst>
-            <a:ext uri="{909E8E84-426E-40DD-AFC4-6F175D3DCCD1}">
-              <a14:hiddenFill xmlns:a14="http://schemas.microsoft.com/office/drawing/2010/main">
-                <a:solidFill>
-                  <a:srgbClr val="FFFFFF"/>
-                </a:solidFill>
-              </a14:hiddenFill>
-            </a:ext>
-          </a:extLst>
-        </p:spPr>
-      </p:pic>
-      <p:pic>
-        <p:nvPicPr>
-          <p:cNvPr id="6" name="Picture 5">
-            <a:extLst>
-              <a:ext uri="{FF2B5EF4-FFF2-40B4-BE49-F238E27FC236}">
-                <a16:creationId xmlns:a16="http://schemas.microsoft.com/office/drawing/2014/main" id="{980AF249-125D-44A1-A48B-7B492FE04687}"/>
-              </a:ext>
-            </a:extLst>
-          </p:cNvPr>
-          <p:cNvPicPr>
-            <a:picLocks noChangeAspect="1" noChangeArrowheads="1"/>
-          </p:cNvPicPr>
-          <p:nvPr/>
-        </p:nvPicPr>
-        <p:blipFill>
-          <a:blip r:embed="rId3">
-            <a:extLst>
-              <a:ext uri="{28A0092B-C50C-407E-A947-70E740481C1C}">
-                <a14:useLocalDpi xmlns:a14="http://schemas.microsoft.com/office/drawing/2010/main" val="0"/>
-              </a:ext>
-            </a:extLst>
-          </a:blip>
-          <a:srcRect/>
-          <a:stretch>
-            <a:fillRect/>
-          </a:stretch>
-        </p:blipFill>
-        <p:spPr bwMode="auto">
-          <a:xfrm>
-            <a:off x="5060445" y="4235888"/>
-            <a:ext cx="1425520" cy="1425520"/>
-          </a:xfrm>
-          <a:prstGeom prst="rect">
-            <a:avLst/>
-          </a:prstGeom>
-          <a:noFill/>
-          <a:extLst>
-            <a:ext uri="{909E8E84-426E-40DD-AFC4-6F175D3DCCD1}">
-              <a14:hiddenFill xmlns:a14="http://schemas.microsoft.com/office/drawing/2010/main">
-                <a:solidFill>
-                  <a:srgbClr val="FFFFFF"/>
-                </a:solidFill>
-              </a14:hiddenFill>
-            </a:ext>
-          </a:extLst>
-        </p:spPr>
-      </p:pic>
-      <p:pic>
-        <p:nvPicPr>
-          <p:cNvPr id="7" name="Picture 6">
-            <a:extLst>
-              <a:ext uri="{FF2B5EF4-FFF2-40B4-BE49-F238E27FC236}">
-                <a16:creationId xmlns:a16="http://schemas.microsoft.com/office/drawing/2014/main" id="{E0505DFE-44A4-4B3F-ACF5-03B66CFD30EA}"/>
-              </a:ext>
-            </a:extLst>
-          </p:cNvPr>
-          <p:cNvPicPr>
-            <a:picLocks noChangeAspect="1" noChangeArrowheads="1"/>
-          </p:cNvPicPr>
-          <p:nvPr/>
-        </p:nvPicPr>
-        <p:blipFill>
-          <a:blip r:embed="rId3">
-            <a:extLst>
-              <a:ext uri="{28A0092B-C50C-407E-A947-70E740481C1C}">
-                <a14:useLocalDpi xmlns:a14="http://schemas.microsoft.com/office/drawing/2010/main" val="0"/>
-              </a:ext>
-            </a:extLst>
-          </a:blip>
-          <a:srcRect/>
-          <a:stretch>
-            <a:fillRect/>
-          </a:stretch>
-        </p:blipFill>
-        <p:spPr bwMode="auto">
-          <a:xfrm>
-            <a:off x="7353302" y="4235888"/>
-            <a:ext cx="1425520" cy="1425520"/>
-          </a:xfrm>
-          <a:prstGeom prst="rect">
-            <a:avLst/>
-          </a:prstGeom>
-          <a:noFill/>
-          <a:extLst>
-            <a:ext uri="{909E8E84-426E-40DD-AFC4-6F175D3DCCD1}">
-              <a14:hiddenFill xmlns:a14="http://schemas.microsoft.com/office/drawing/2010/main">
-                <a:solidFill>
-                  <a:srgbClr val="FFFFFF"/>
-                </a:solidFill>
-              </a14:hiddenFill>
-            </a:ext>
-          </a:extLst>
-        </p:spPr>
-      </p:pic>
-      <p:pic>
-        <p:nvPicPr>
           <p:cNvPr id="11" name="Picture 10" descr="A picture containing text, clipart&#10;&#10;Description automatically generated">
             <a:extLst>
               <a:ext uri="{FF2B5EF4-FFF2-40B4-BE49-F238E27FC236}">
@@ -16125,7 +15983,7 @@
           <p:nvPr/>
         </p:nvPicPr>
         <p:blipFill>
-          <a:blip r:embed="rId4">
+          <a:blip r:embed="rId3">
             <a:extLst>
               <a:ext uri="{28A0092B-C50C-407E-A947-70E740481C1C}">
                 <a14:useLocalDpi xmlns:a14="http://schemas.microsoft.com/office/drawing/2010/main" val="0"/>

</xml_diff>

<commit_message>
Updates for the 09.20.22 workshop.
</commit_message>
<xml_diff>
--- a/presentations/01_ethics.pptx
+++ b/presentations/01_ethics.pptx
@@ -239,7 +239,7 @@
           <a:p>
             <a:fld id="{FD93C9B2-20F6-4DB1-B471-224337D0AC79}" type="datetimeFigureOut">
               <a:rPr lang="en-US" smtClean="0"/>
-              <a:t>9/16/2022</a:t>
+              <a:t>9/20/2022</a:t>
             </a:fld>
             <a:endParaRPr lang="en-US"/>
           </a:p>
@@ -2350,15 +2350,6 @@
           <a:p>
             <a:endParaRPr lang="en-US" dirty="0"/>
           </a:p>
-          <a:p>
-            <a:r>
-              <a:rPr lang="en-US" dirty="0"/>
-              <a:t>Let’s take a poll…</a:t>
-            </a:r>
-          </a:p>
-          <a:p>
-            <a:endParaRPr lang="en-US" dirty="0"/>
-          </a:p>
         </p:txBody>
       </p:sp>
       <p:sp>
@@ -2643,6 +2634,15 @@
             <a:r>
               <a:rPr lang="en-US" dirty="0"/>
               <a:t>As it turned out, this was a system (model) error: nothing more than sunlight, reflecting off the clouds over North Dakota.</a:t>
+            </a:r>
+          </a:p>
+          <a:p>
+            <a:endParaRPr lang="en-US" dirty="0"/>
+          </a:p>
+          <a:p>
+            <a:r>
+              <a:rPr lang="en-US" dirty="0"/>
+              <a:t>But what if the system in question was 95% certain that you – a banker – should not loan $100k to a small, locally owned business.  Would you follow its recommendation?  </a:t>
             </a:r>
           </a:p>
         </p:txBody>
@@ -5653,7 +5653,7 @@
           <a:p>
             <a:fld id="{C3F78080-8D0A-4BE8-A5B4-CB115102D524}" type="datetimeFigureOut">
               <a:rPr lang="en-US" smtClean="0"/>
-              <a:t>9/16/2022</a:t>
+              <a:t>9/20/2022</a:t>
             </a:fld>
             <a:endParaRPr lang="en-US"/>
           </a:p>
@@ -5851,7 +5851,7 @@
           <a:p>
             <a:fld id="{C3F78080-8D0A-4BE8-A5B4-CB115102D524}" type="datetimeFigureOut">
               <a:rPr lang="en-US" smtClean="0"/>
-              <a:t>9/16/2022</a:t>
+              <a:t>9/20/2022</a:t>
             </a:fld>
             <a:endParaRPr lang="en-US"/>
           </a:p>
@@ -6059,7 +6059,7 @@
           <a:p>
             <a:fld id="{C3F78080-8D0A-4BE8-A5B4-CB115102D524}" type="datetimeFigureOut">
               <a:rPr lang="en-US" smtClean="0"/>
-              <a:t>9/16/2022</a:t>
+              <a:t>9/20/2022</a:t>
             </a:fld>
             <a:endParaRPr lang="en-US"/>
           </a:p>
@@ -6257,7 +6257,7 @@
           <a:p>
             <a:fld id="{C3F78080-8D0A-4BE8-A5B4-CB115102D524}" type="datetimeFigureOut">
               <a:rPr lang="en-US" smtClean="0"/>
-              <a:t>9/16/2022</a:t>
+              <a:t>9/20/2022</a:t>
             </a:fld>
             <a:endParaRPr lang="en-US"/>
           </a:p>
@@ -6532,7 +6532,7 @@
           <a:p>
             <a:fld id="{C3F78080-8D0A-4BE8-A5B4-CB115102D524}" type="datetimeFigureOut">
               <a:rPr lang="en-US" smtClean="0"/>
-              <a:t>9/16/2022</a:t>
+              <a:t>9/20/2022</a:t>
             </a:fld>
             <a:endParaRPr lang="en-US"/>
           </a:p>
@@ -6797,7 +6797,7 @@
           <a:p>
             <a:fld id="{C3F78080-8D0A-4BE8-A5B4-CB115102D524}" type="datetimeFigureOut">
               <a:rPr lang="en-US" smtClean="0"/>
-              <a:t>9/16/2022</a:t>
+              <a:t>9/20/2022</a:t>
             </a:fld>
             <a:endParaRPr lang="en-US"/>
           </a:p>
@@ -7209,7 +7209,7 @@
           <a:p>
             <a:fld id="{C3F78080-8D0A-4BE8-A5B4-CB115102D524}" type="datetimeFigureOut">
               <a:rPr lang="en-US" smtClean="0"/>
-              <a:t>9/16/2022</a:t>
+              <a:t>9/20/2022</a:t>
             </a:fld>
             <a:endParaRPr lang="en-US"/>
           </a:p>
@@ -7350,7 +7350,7 @@
           <a:p>
             <a:fld id="{C3F78080-8D0A-4BE8-A5B4-CB115102D524}" type="datetimeFigureOut">
               <a:rPr lang="en-US" smtClean="0"/>
-              <a:t>9/16/2022</a:t>
+              <a:t>9/20/2022</a:t>
             </a:fld>
             <a:endParaRPr lang="en-US"/>
           </a:p>
@@ -7463,7 +7463,7 @@
           <a:p>
             <a:fld id="{C3F78080-8D0A-4BE8-A5B4-CB115102D524}" type="datetimeFigureOut">
               <a:rPr lang="en-US" smtClean="0"/>
-              <a:t>9/16/2022</a:t>
+              <a:t>9/20/2022</a:t>
             </a:fld>
             <a:endParaRPr lang="en-US"/>
           </a:p>
@@ -7774,7 +7774,7 @@
           <a:p>
             <a:fld id="{C3F78080-8D0A-4BE8-A5B4-CB115102D524}" type="datetimeFigureOut">
               <a:rPr lang="en-US" smtClean="0"/>
-              <a:t>9/16/2022</a:t>
+              <a:t>9/20/2022</a:t>
             </a:fld>
             <a:endParaRPr lang="en-US"/>
           </a:p>
@@ -8062,7 +8062,7 @@
           <a:p>
             <a:fld id="{C3F78080-8D0A-4BE8-A5B4-CB115102D524}" type="datetimeFigureOut">
               <a:rPr lang="en-US" smtClean="0"/>
-              <a:t>9/16/2022</a:t>
+              <a:t>9/20/2022</a:t>
             </a:fld>
             <a:endParaRPr lang="en-US"/>
           </a:p>
@@ -8303,7 +8303,7 @@
           <a:p>
             <a:fld id="{C3F78080-8D0A-4BE8-A5B4-CB115102D524}" type="datetimeFigureOut">
               <a:rPr lang="en-US" smtClean="0"/>
-              <a:t>9/16/2022</a:t>
+              <a:t>9/20/2022</a:t>
             </a:fld>
             <a:endParaRPr lang="en-US"/>
           </a:p>
@@ -9635,7 +9635,7 @@
         </p:nvSpPr>
         <p:spPr>
           <a:xfrm>
-            <a:off x="961059" y="1250520"/>
+            <a:off x="961059" y="1314020"/>
             <a:ext cx="10269882" cy="5498941"/>
           </a:xfrm>
           <a:prstGeom prst="rect">
@@ -11747,10 +11747,10 @@
       </p:grpSpPr>
       <p:sp>
         <p:nvSpPr>
-          <p:cNvPr id="4" name="TextBox 3">
+          <p:cNvPr id="7" name="TextBox 6">
             <a:extLst>
               <a:ext uri="{FF2B5EF4-FFF2-40B4-BE49-F238E27FC236}">
-                <a16:creationId xmlns:a16="http://schemas.microsoft.com/office/drawing/2014/main" id="{F67FDF0A-B86B-4F43-81F3-207FCABE8869}"/>
+                <a16:creationId xmlns:a16="http://schemas.microsoft.com/office/drawing/2014/main" id="{6784BE00-0EF0-4ADD-808B-A7218249EF4D}"/>
               </a:ext>
             </a:extLst>
           </p:cNvPr>
@@ -11759,8 +11759,8 @@
         </p:nvSpPr>
         <p:spPr>
           <a:xfrm>
-            <a:off x="0" y="6535578"/>
-            <a:ext cx="12192000" cy="307777"/>
+            <a:off x="0" y="3024666"/>
+            <a:ext cx="12192000" cy="1333698"/>
           </a:xfrm>
           <a:prstGeom prst="rect">
             <a:avLst/>
@@ -11768,422 +11768,56 @@
           <a:noFill/>
         </p:spPr>
         <p:txBody>
-          <a:bodyPr wrap="square" rtlCol="0">
+          <a:bodyPr wrap="square">
             <a:spAutoFit/>
           </a:bodyPr>
           <a:lstStyle/>
           <a:p>
-            <a:r>
-              <a:rPr lang="en-US" sz="1400" b="0" i="0" dirty="0">
+            <a:pPr algn="ctr" rtl="0">
+              <a:spcBef>
+                <a:spcPts val="1600"/>
+              </a:spcBef>
+              <a:spcAft>
+                <a:spcPts val="400"/>
+              </a:spcAft>
+            </a:pPr>
+            <a:r>
+              <a:rPr lang="en-US" sz="3200" dirty="0">
                 <a:solidFill>
                   <a:schemeClr val="tx1">
-                    <a:lumMod val="50000"/>
-                    <a:lumOff val="50000"/>
+                    <a:lumMod val="65000"/>
+                    <a:lumOff val="35000"/>
                   </a:schemeClr>
                 </a:solidFill>
-                <a:effectLst/>
-                <a:latin typeface="+mj-lt"/>
-              </a:rPr>
-              <a:t>Source: Christian, B (2020). </a:t>
-            </a:r>
-            <a:r>
-              <a:rPr lang="en-US" sz="1400" i="1" dirty="0">
+                <a:latin typeface="Palatino Linotype" panose="02040502050505030304" pitchFamily="18" charset="0"/>
+              </a:rPr>
+              <a:t>If a system is 100% confident, would you </a:t>
+            </a:r>
+          </a:p>
+          <a:p>
+            <a:pPr algn="ctr" rtl="0">
+              <a:spcBef>
+                <a:spcPts val="1600"/>
+              </a:spcBef>
+              <a:spcAft>
+                <a:spcPts val="400"/>
+              </a:spcAft>
+            </a:pPr>
+            <a:r>
+              <a:rPr lang="en-US" sz="3200" dirty="0">
                 <a:solidFill>
                   <a:schemeClr val="tx1">
-                    <a:lumMod val="50000"/>
-                    <a:lumOff val="50000"/>
+                    <a:lumMod val="65000"/>
+                    <a:lumOff val="35000"/>
                   </a:schemeClr>
                 </a:solidFill>
-                <a:latin typeface="+mj-lt"/>
-              </a:rPr>
-              <a:t>The alignment problem: Machine learning and human values</a:t>
-            </a:r>
-            <a:r>
-              <a:rPr lang="en-US" sz="1400" b="0" i="0" dirty="0">
-                <a:solidFill>
-                  <a:schemeClr val="tx1">
-                    <a:lumMod val="50000"/>
-                    <a:lumOff val="50000"/>
-                  </a:schemeClr>
-                </a:solidFill>
-                <a:effectLst/>
-                <a:latin typeface="+mj-lt"/>
-              </a:rPr>
-              <a:t>. New York, NY: </a:t>
-            </a:r>
-            <a:r>
-              <a:rPr lang="en-US" sz="1400" dirty="0">
-                <a:solidFill>
-                  <a:schemeClr val="tx1">
-                    <a:lumMod val="50000"/>
-                    <a:lumOff val="50000"/>
-                  </a:schemeClr>
-                </a:solidFill>
-                <a:latin typeface="+mj-lt"/>
-              </a:rPr>
-              <a:t>W.W. Norton &amp; Company</a:t>
-            </a:r>
-            <a:r>
-              <a:rPr lang="en-US" sz="1400" b="0" i="0" dirty="0">
-                <a:solidFill>
-                  <a:schemeClr val="tx1">
-                    <a:lumMod val="50000"/>
-                    <a:lumOff val="50000"/>
-                  </a:schemeClr>
-                </a:solidFill>
-                <a:effectLst/>
-                <a:latin typeface="+mj-lt"/>
-              </a:rPr>
-              <a:t>.</a:t>
-            </a:r>
-            <a:endParaRPr lang="en-US" sz="1400" dirty="0">
-              <a:solidFill>
-                <a:schemeClr val="tx1">
-                  <a:lumMod val="50000"/>
-                  <a:lumOff val="50000"/>
-                </a:schemeClr>
-              </a:solidFill>
-              <a:latin typeface="+mj-lt"/>
-            </a:endParaRPr>
-          </a:p>
-        </p:txBody>
-      </p:sp>
-      <p:sp>
-        <p:nvSpPr>
-          <p:cNvPr id="5" name="Rectangle 4">
-            <a:extLst>
-              <a:ext uri="{FF2B5EF4-FFF2-40B4-BE49-F238E27FC236}">
-                <a16:creationId xmlns:a16="http://schemas.microsoft.com/office/drawing/2014/main" id="{0965A731-2830-4DB1-946A-F8C5C30B73DE}"/>
-              </a:ext>
-            </a:extLst>
-          </p:cNvPr>
-          <p:cNvSpPr/>
-          <p:nvPr/>
-        </p:nvSpPr>
-        <p:spPr>
-          <a:xfrm>
-            <a:off x="7576057" y="2277538"/>
-            <a:ext cx="1625600" cy="2085920"/>
-          </a:xfrm>
-          <a:prstGeom prst="rect">
-            <a:avLst/>
-          </a:prstGeom>
-          <a:ln>
-            <a:solidFill>
-              <a:schemeClr val="tx1">
-                <a:lumMod val="65000"/>
-                <a:lumOff val="35000"/>
-              </a:schemeClr>
-            </a:solidFill>
-          </a:ln>
-          <a:effectLst>
-            <a:outerShdw blurRad="50800" dist="38100" dir="2700000" algn="tl" rotWithShape="0">
-              <a:prstClr val="black">
-                <a:alpha val="40000"/>
-              </a:prstClr>
-            </a:outerShdw>
-          </a:effectLst>
-        </p:spPr>
-        <p:style>
-          <a:lnRef idx="2">
-            <a:schemeClr val="accent1"/>
-          </a:lnRef>
-          <a:fillRef idx="1">
-            <a:schemeClr val="lt1"/>
-          </a:fillRef>
-          <a:effectRef idx="0">
-            <a:schemeClr val="accent1"/>
-          </a:effectRef>
-          <a:fontRef idx="minor">
-            <a:schemeClr val="dk1"/>
-          </a:fontRef>
-        </p:style>
-        <p:txBody>
-          <a:bodyPr tIns="45720" rtlCol="0" anchor="t" anchorCtr="0"/>
-          <a:lstStyle/>
-          <a:p>
-            <a:pPr algn="ctr"/>
-            <a:r>
-              <a:rPr lang="en-US" dirty="0">
                 <a:latin typeface="Palatino Linotype" panose="02040502050505030304" pitchFamily="18" charset="0"/>
               </a:rPr>
-              <a:t>Maybe</a:t>
-            </a:r>
-            <a:endParaRPr lang="en-US" dirty="0"/>
-          </a:p>
-        </p:txBody>
-      </p:sp>
-      <p:sp>
-        <p:nvSpPr>
-          <p:cNvPr id="6" name="Rectangle 5">
-            <a:extLst>
-              <a:ext uri="{FF2B5EF4-FFF2-40B4-BE49-F238E27FC236}">
-                <a16:creationId xmlns:a16="http://schemas.microsoft.com/office/drawing/2014/main" id="{8D44F923-3D86-4908-97FD-125E9C627CB1}"/>
-              </a:ext>
-            </a:extLst>
-          </p:cNvPr>
-          <p:cNvSpPr/>
-          <p:nvPr/>
-        </p:nvSpPr>
-        <p:spPr>
-          <a:xfrm>
-            <a:off x="5283200" y="2277538"/>
-            <a:ext cx="1625600" cy="2085920"/>
-          </a:xfrm>
-          <a:prstGeom prst="rect">
-            <a:avLst/>
-          </a:prstGeom>
-          <a:ln>
-            <a:solidFill>
-              <a:schemeClr val="tx1">
-                <a:lumMod val="65000"/>
-                <a:lumOff val="35000"/>
-              </a:schemeClr>
-            </a:solidFill>
-          </a:ln>
-          <a:effectLst>
-            <a:outerShdw blurRad="50800" dist="38100" dir="2700000" algn="tl" rotWithShape="0">
-              <a:prstClr val="black">
-                <a:alpha val="40000"/>
-              </a:prstClr>
-            </a:outerShdw>
-          </a:effectLst>
-        </p:spPr>
-        <p:style>
-          <a:lnRef idx="2">
-            <a:schemeClr val="accent1"/>
-          </a:lnRef>
-          <a:fillRef idx="1">
-            <a:schemeClr val="lt1"/>
-          </a:fillRef>
-          <a:effectRef idx="0">
-            <a:schemeClr val="accent1"/>
-          </a:effectRef>
-          <a:fontRef idx="minor">
-            <a:schemeClr val="dk1"/>
-          </a:fontRef>
-        </p:style>
-        <p:txBody>
-          <a:bodyPr tIns="45720" rtlCol="0" anchor="t" anchorCtr="0"/>
-          <a:lstStyle/>
-          <a:p>
-            <a:pPr algn="ctr"/>
-            <a:r>
-              <a:rPr lang="en-US" dirty="0">
-                <a:latin typeface="Palatino Linotype" panose="02040502050505030304" pitchFamily="18" charset="0"/>
-              </a:rPr>
-              <a:t>No</a:t>
-            </a:r>
-            <a:endParaRPr lang="en-US" dirty="0"/>
-          </a:p>
-        </p:txBody>
-      </p:sp>
-      <p:sp>
-        <p:nvSpPr>
-          <p:cNvPr id="7" name="Rectangle 6">
-            <a:extLst>
-              <a:ext uri="{FF2B5EF4-FFF2-40B4-BE49-F238E27FC236}">
-                <a16:creationId xmlns:a16="http://schemas.microsoft.com/office/drawing/2014/main" id="{E37A3652-4D6A-4FD1-9302-CEAFE2DFAA06}"/>
-              </a:ext>
-            </a:extLst>
-          </p:cNvPr>
-          <p:cNvSpPr/>
-          <p:nvPr/>
-        </p:nvSpPr>
-        <p:spPr>
-          <a:xfrm>
-            <a:off x="3035300" y="2277538"/>
-            <a:ext cx="1625600" cy="2085920"/>
-          </a:xfrm>
-          <a:prstGeom prst="rect">
-            <a:avLst/>
-          </a:prstGeom>
-          <a:ln>
-            <a:solidFill>
-              <a:schemeClr val="tx1">
-                <a:lumMod val="65000"/>
-                <a:lumOff val="35000"/>
-              </a:schemeClr>
-            </a:solidFill>
-          </a:ln>
-          <a:effectLst>
-            <a:outerShdw blurRad="50800" dist="38100" dir="2700000" algn="tl" rotWithShape="0">
-              <a:prstClr val="black">
-                <a:alpha val="40000"/>
-              </a:prstClr>
-            </a:outerShdw>
-          </a:effectLst>
-        </p:spPr>
-        <p:style>
-          <a:lnRef idx="2">
-            <a:schemeClr val="accent1"/>
-          </a:lnRef>
-          <a:fillRef idx="1">
-            <a:schemeClr val="lt1"/>
-          </a:fillRef>
-          <a:effectRef idx="0">
-            <a:schemeClr val="accent1"/>
-          </a:effectRef>
-          <a:fontRef idx="minor">
-            <a:schemeClr val="dk1"/>
-          </a:fontRef>
-        </p:style>
-        <p:txBody>
-          <a:bodyPr tIns="45720" rtlCol="0" anchor="t" anchorCtr="0"/>
-          <a:lstStyle/>
-          <a:p>
-            <a:pPr algn="ctr"/>
-            <a:r>
-              <a:rPr lang="en-US" dirty="0">
-                <a:latin typeface="Palatino Linotype" panose="02040502050505030304" pitchFamily="18" charset="0"/>
-              </a:rPr>
-              <a:t>Yes</a:t>
-            </a:r>
-            <a:endParaRPr lang="en-US" dirty="0"/>
-          </a:p>
-        </p:txBody>
-      </p:sp>
-      <p:pic>
-        <p:nvPicPr>
-          <p:cNvPr id="8" name="Picture 7">
-            <a:extLst>
-              <a:ext uri="{FF2B5EF4-FFF2-40B4-BE49-F238E27FC236}">
-                <a16:creationId xmlns:a16="http://schemas.microsoft.com/office/drawing/2014/main" id="{D73B00BA-7335-481C-AD2B-4C35C778514E}"/>
-              </a:ext>
-            </a:extLst>
-          </p:cNvPr>
-          <p:cNvPicPr>
-            <a:picLocks noChangeAspect="1" noChangeArrowheads="1"/>
-          </p:cNvPicPr>
-          <p:nvPr/>
-        </p:nvPicPr>
-        <p:blipFill>
-          <a:blip r:embed="rId3">
-            <a:extLst>
-              <a:ext uri="{28A0092B-C50C-407E-A947-70E740481C1C}">
-                <a14:useLocalDpi xmlns:a14="http://schemas.microsoft.com/office/drawing/2010/main" val="0"/>
-              </a:ext>
-            </a:extLst>
-          </a:blip>
-          <a:srcRect/>
-          <a:stretch>
-            <a:fillRect/>
-          </a:stretch>
-        </p:blipFill>
-        <p:spPr bwMode="auto">
-          <a:xfrm>
-            <a:off x="3135340" y="2716240"/>
-            <a:ext cx="1425520" cy="1425520"/>
-          </a:xfrm>
-          <a:prstGeom prst="rect">
-            <a:avLst/>
-          </a:prstGeom>
-          <a:noFill/>
-          <a:extLst>
-            <a:ext uri="{909E8E84-426E-40DD-AFC4-6F175D3DCCD1}">
-              <a14:hiddenFill xmlns:a14="http://schemas.microsoft.com/office/drawing/2010/main">
-                <a:solidFill>
-                  <a:srgbClr val="FFFFFF"/>
-                </a:solidFill>
-              </a14:hiddenFill>
-            </a:ext>
-          </a:extLst>
-        </p:spPr>
-      </p:pic>
-      <p:pic>
-        <p:nvPicPr>
-          <p:cNvPr id="9" name="Picture 8">
-            <a:extLst>
-              <a:ext uri="{FF2B5EF4-FFF2-40B4-BE49-F238E27FC236}">
-                <a16:creationId xmlns:a16="http://schemas.microsoft.com/office/drawing/2014/main" id="{34754185-F777-4356-BFC2-C893078EF8B3}"/>
-              </a:ext>
-            </a:extLst>
-          </p:cNvPr>
-          <p:cNvPicPr>
-            <a:picLocks noChangeAspect="1" noChangeArrowheads="1"/>
-          </p:cNvPicPr>
-          <p:nvPr/>
-        </p:nvPicPr>
-        <p:blipFill>
-          <a:blip r:embed="rId3">
-            <a:extLst>
-              <a:ext uri="{28A0092B-C50C-407E-A947-70E740481C1C}">
-                <a14:useLocalDpi xmlns:a14="http://schemas.microsoft.com/office/drawing/2010/main" val="0"/>
-              </a:ext>
-            </a:extLst>
-          </a:blip>
-          <a:srcRect/>
-          <a:stretch>
-            <a:fillRect/>
-          </a:stretch>
-        </p:blipFill>
-        <p:spPr bwMode="auto">
-          <a:xfrm>
-            <a:off x="5383240" y="2716240"/>
-            <a:ext cx="1425520" cy="1425520"/>
-          </a:xfrm>
-          <a:prstGeom prst="rect">
-            <a:avLst/>
-          </a:prstGeom>
-          <a:noFill/>
-          <a:extLst>
-            <a:ext uri="{909E8E84-426E-40DD-AFC4-6F175D3DCCD1}">
-              <a14:hiddenFill xmlns:a14="http://schemas.microsoft.com/office/drawing/2010/main">
-                <a:solidFill>
-                  <a:srgbClr val="FFFFFF"/>
-                </a:solidFill>
-              </a14:hiddenFill>
-            </a:ext>
-          </a:extLst>
-        </p:spPr>
-      </p:pic>
-      <p:pic>
-        <p:nvPicPr>
-          <p:cNvPr id="10" name="Picture 9">
-            <a:extLst>
-              <a:ext uri="{FF2B5EF4-FFF2-40B4-BE49-F238E27FC236}">
-                <a16:creationId xmlns:a16="http://schemas.microsoft.com/office/drawing/2014/main" id="{FCD018EA-1603-410F-ADB6-81AB20E56061}"/>
-              </a:ext>
-            </a:extLst>
-          </p:cNvPr>
-          <p:cNvPicPr>
-            <a:picLocks noChangeAspect="1" noChangeArrowheads="1"/>
-          </p:cNvPicPr>
-          <p:nvPr/>
-        </p:nvPicPr>
-        <p:blipFill>
-          <a:blip r:embed="rId3">
-            <a:extLst>
-              <a:ext uri="{28A0092B-C50C-407E-A947-70E740481C1C}">
-                <a14:useLocalDpi xmlns:a14="http://schemas.microsoft.com/office/drawing/2010/main" val="0"/>
-              </a:ext>
-            </a:extLst>
-          </a:blip>
-          <a:srcRect/>
-          <a:stretch>
-            <a:fillRect/>
-          </a:stretch>
-        </p:blipFill>
-        <p:spPr bwMode="auto">
-          <a:xfrm>
-            <a:off x="7676097" y="2716240"/>
-            <a:ext cx="1425520" cy="1425520"/>
-          </a:xfrm>
-          <a:prstGeom prst="rect">
-            <a:avLst/>
-          </a:prstGeom>
-          <a:noFill/>
-          <a:extLst>
-            <a:ext uri="{909E8E84-426E-40DD-AFC4-6F175D3DCCD1}">
-              <a14:hiddenFill xmlns:a14="http://schemas.microsoft.com/office/drawing/2010/main">
-                <a:solidFill>
-                  <a:srgbClr val="FFFFFF"/>
-                </a:solidFill>
-              </a14:hiddenFill>
-            </a:ext>
-          </a:extLst>
-        </p:spPr>
-      </p:pic>
+              <a:t>act on its recommendations?</a:t>
+            </a:r>
+          </a:p>
+        </p:txBody>
+      </p:sp>
     </p:spTree>
     <p:extLst>
       <p:ext uri="{BB962C8B-B14F-4D97-AF65-F5344CB8AC3E}">
@@ -15773,201 +15407,6 @@
           <a:chExt cx="0" cy="0"/>
         </a:xfrm>
       </p:grpSpPr>
-      <p:sp>
-        <p:nvSpPr>
-          <p:cNvPr id="9" name="Rectangle 8">
-            <a:extLst>
-              <a:ext uri="{FF2B5EF4-FFF2-40B4-BE49-F238E27FC236}">
-                <a16:creationId xmlns:a16="http://schemas.microsoft.com/office/drawing/2014/main" id="{B70B686E-852C-4E60-A05C-0CCB2FCC2206}"/>
-              </a:ext>
-            </a:extLst>
-          </p:cNvPr>
-          <p:cNvSpPr/>
-          <p:nvPr/>
-        </p:nvSpPr>
-        <p:spPr>
-          <a:xfrm>
-            <a:off x="7253262" y="3797186"/>
-            <a:ext cx="1625600" cy="907016"/>
-          </a:xfrm>
-          <a:prstGeom prst="rect">
-            <a:avLst/>
-          </a:prstGeom>
-          <a:ln>
-            <a:solidFill>
-              <a:schemeClr val="tx1">
-                <a:lumMod val="65000"/>
-                <a:lumOff val="35000"/>
-              </a:schemeClr>
-            </a:solidFill>
-          </a:ln>
-          <a:effectLst>
-            <a:outerShdw blurRad="50800" dist="38100" dir="2700000" algn="tl" rotWithShape="0">
-              <a:prstClr val="black">
-                <a:alpha val="40000"/>
-              </a:prstClr>
-            </a:outerShdw>
-          </a:effectLst>
-        </p:spPr>
-        <p:style>
-          <a:lnRef idx="2">
-            <a:schemeClr val="accent1"/>
-          </a:lnRef>
-          <a:fillRef idx="1">
-            <a:schemeClr val="lt1"/>
-          </a:fillRef>
-          <a:effectRef idx="0">
-            <a:schemeClr val="accent1"/>
-          </a:effectRef>
-          <a:fontRef idx="minor">
-            <a:schemeClr val="dk1"/>
-          </a:fontRef>
-        </p:style>
-        <p:txBody>
-          <a:bodyPr tIns="45720" rtlCol="0" anchor="t" anchorCtr="0"/>
-          <a:lstStyle/>
-          <a:p>
-            <a:pPr algn="ctr"/>
-            <a:r>
-              <a:rPr lang="en-US" dirty="0">
-                <a:latin typeface="Palatino Linotype" panose="02040502050505030304" pitchFamily="18" charset="0"/>
-              </a:rPr>
-              <a:t>Maybe</a:t>
-            </a:r>
-            <a:endParaRPr lang="en-US" dirty="0"/>
-          </a:p>
-        </p:txBody>
-      </p:sp>
-      <p:sp>
-        <p:nvSpPr>
-          <p:cNvPr id="8" name="Rectangle 7">
-            <a:extLst>
-              <a:ext uri="{FF2B5EF4-FFF2-40B4-BE49-F238E27FC236}">
-                <a16:creationId xmlns:a16="http://schemas.microsoft.com/office/drawing/2014/main" id="{5D152B19-BE45-425A-98CA-13C2BD7B2868}"/>
-              </a:ext>
-            </a:extLst>
-          </p:cNvPr>
-          <p:cNvSpPr/>
-          <p:nvPr/>
-        </p:nvSpPr>
-        <p:spPr>
-          <a:xfrm>
-            <a:off x="4960405" y="3797186"/>
-            <a:ext cx="1625600" cy="907016"/>
-          </a:xfrm>
-          <a:prstGeom prst="rect">
-            <a:avLst/>
-          </a:prstGeom>
-          <a:ln>
-            <a:solidFill>
-              <a:schemeClr val="tx1">
-                <a:lumMod val="65000"/>
-                <a:lumOff val="35000"/>
-              </a:schemeClr>
-            </a:solidFill>
-          </a:ln>
-          <a:effectLst>
-            <a:outerShdw blurRad="50800" dist="38100" dir="2700000" algn="tl" rotWithShape="0">
-              <a:prstClr val="black">
-                <a:alpha val="40000"/>
-              </a:prstClr>
-            </a:outerShdw>
-          </a:effectLst>
-        </p:spPr>
-        <p:style>
-          <a:lnRef idx="2">
-            <a:schemeClr val="accent1"/>
-          </a:lnRef>
-          <a:fillRef idx="1">
-            <a:schemeClr val="lt1"/>
-          </a:fillRef>
-          <a:effectRef idx="0">
-            <a:schemeClr val="accent1"/>
-          </a:effectRef>
-          <a:fontRef idx="minor">
-            <a:schemeClr val="dk1"/>
-          </a:fontRef>
-        </p:style>
-        <p:txBody>
-          <a:bodyPr tIns="45720" rtlCol="0" anchor="t" anchorCtr="0"/>
-          <a:lstStyle/>
-          <a:p>
-            <a:pPr algn="ctr"/>
-            <a:r>
-              <a:rPr lang="en-US" dirty="0">
-                <a:latin typeface="Palatino Linotype" panose="02040502050505030304" pitchFamily="18" charset="0"/>
-              </a:rPr>
-              <a:t>No</a:t>
-            </a:r>
-            <a:endParaRPr lang="en-US" dirty="0"/>
-          </a:p>
-        </p:txBody>
-      </p:sp>
-      <p:sp>
-        <p:nvSpPr>
-          <p:cNvPr id="2" name="Rectangle 1">
-            <a:extLst>
-              <a:ext uri="{FF2B5EF4-FFF2-40B4-BE49-F238E27FC236}">
-                <a16:creationId xmlns:a16="http://schemas.microsoft.com/office/drawing/2014/main" id="{796B247D-42CF-4169-8E49-0D0399F19725}"/>
-              </a:ext>
-            </a:extLst>
-          </p:cNvPr>
-          <p:cNvSpPr/>
-          <p:nvPr/>
-        </p:nvSpPr>
-        <p:spPr>
-          <a:xfrm>
-            <a:off x="2712505" y="3797186"/>
-            <a:ext cx="1625600" cy="907016"/>
-          </a:xfrm>
-          <a:prstGeom prst="rect">
-            <a:avLst/>
-          </a:prstGeom>
-          <a:ln>
-            <a:solidFill>
-              <a:schemeClr val="tx1">
-                <a:lumMod val="65000"/>
-                <a:lumOff val="35000"/>
-              </a:schemeClr>
-            </a:solidFill>
-          </a:ln>
-          <a:effectLst>
-            <a:outerShdw blurRad="50800" dist="38100" dir="2700000" algn="tl" rotWithShape="0">
-              <a:prstClr val="black">
-                <a:alpha val="40000"/>
-              </a:prstClr>
-            </a:outerShdw>
-          </a:effectLst>
-        </p:spPr>
-        <p:style>
-          <a:lnRef idx="2">
-            <a:schemeClr val="accent1"/>
-          </a:lnRef>
-          <a:fillRef idx="1">
-            <a:schemeClr val="lt1"/>
-          </a:fillRef>
-          <a:effectRef idx="0">
-            <a:schemeClr val="accent1"/>
-          </a:effectRef>
-          <a:fontRef idx="minor">
-            <a:schemeClr val="dk1"/>
-          </a:fontRef>
-        </p:style>
-        <p:txBody>
-          <a:bodyPr tIns="45720" rtlCol="0" anchor="t" anchorCtr="0"/>
-          <a:lstStyle/>
-          <a:p>
-            <a:pPr algn="ctr"/>
-            <a:r>
-              <a:rPr lang="en-US" dirty="0">
-                <a:latin typeface="Palatino Linotype" panose="02040502050505030304" pitchFamily="18" charset="0"/>
-              </a:rPr>
-              <a:t>Yes</a:t>
-            </a:r>
-            <a:endParaRPr lang="en-US" dirty="0"/>
-          </a:p>
-        </p:txBody>
-      </p:sp>
       <p:pic>
         <p:nvPicPr>
           <p:cNvPr id="11" name="Picture 10" descr="A picture containing text, clipart&#10;&#10;Description automatically generated">
@@ -16004,6 +15443,57 @@
           </a:prstGeom>
         </p:spPr>
       </p:pic>
+      <p:sp>
+        <p:nvSpPr>
+          <p:cNvPr id="6" name="TextBox 5">
+            <a:extLst>
+              <a:ext uri="{FF2B5EF4-FFF2-40B4-BE49-F238E27FC236}">
+                <a16:creationId xmlns:a16="http://schemas.microsoft.com/office/drawing/2014/main" id="{9598D031-5218-424B-BD18-EB908A069B38}"/>
+              </a:ext>
+            </a:extLst>
+          </p:cNvPr>
+          <p:cNvSpPr txBox="1"/>
+          <p:nvPr/>
+        </p:nvSpPr>
+        <p:spPr>
+          <a:xfrm>
+            <a:off x="0" y="3705603"/>
+            <a:ext cx="12192000" cy="584775"/>
+          </a:xfrm>
+          <a:prstGeom prst="rect">
+            <a:avLst/>
+          </a:prstGeom>
+          <a:noFill/>
+        </p:spPr>
+        <p:txBody>
+          <a:bodyPr wrap="square">
+            <a:spAutoFit/>
+          </a:bodyPr>
+          <a:lstStyle/>
+          <a:p>
+            <a:pPr algn="ctr" rtl="0">
+              <a:spcBef>
+                <a:spcPts val="1600"/>
+              </a:spcBef>
+              <a:spcAft>
+                <a:spcPts val="400"/>
+              </a:spcAft>
+            </a:pPr>
+            <a:r>
+              <a:rPr lang="en-US" sz="3200" dirty="0">
+                <a:solidFill>
+                  <a:schemeClr val="tx1">
+                    <a:lumMod val="65000"/>
+                    <a:lumOff val="35000"/>
+                  </a:schemeClr>
+                </a:solidFill>
+                <a:latin typeface="Palatino Linotype" panose="02040502050505030304" pitchFamily="18" charset="0"/>
+              </a:rPr>
+              <a:t>Would you work at a company like Affectiva?</a:t>
+            </a:r>
+          </a:p>
+        </p:txBody>
+      </p:sp>
     </p:spTree>
     <p:extLst>
       <p:ext uri="{BB962C8B-B14F-4D97-AF65-F5344CB8AC3E}">

</xml_diff>